<commit_message>
cfs proj - final edit
</commit_message>
<xml_diff>
--- a/AzureCase_TM_coe_v2.pptx
+++ b/AzureCase_TM_coe_v2.pptx
@@ -15,8 +15,8 @@
     <p:sldId id="274" r:id="rId6"/>
     <p:sldId id="277" r:id="rId7"/>
     <p:sldId id="278" r:id="rId8"/>
-    <p:sldId id="269" r:id="rId9"/>
-    <p:sldId id="279" r:id="rId10"/>
+    <p:sldId id="280" r:id="rId9"/>
+    <p:sldId id="269" r:id="rId10"/>
   </p:sldIdLst>
   <p:sldSz cx="9144000" cy="5143500" type="screen16x9"/>
   <p:notesSz cx="6858000" cy="9144000"/>
@@ -830,6 +830,122 @@
 </file>
 
 <file path=ppt/notesSlides/notesSlide4.xml><?xml version="1.0" encoding="utf-8"?>
+<p:notes xmlns:a="http://schemas.openxmlformats.org/drawingml/2006/main" xmlns:r="http://schemas.openxmlformats.org/officeDocument/2006/relationships" xmlns:p="http://schemas.openxmlformats.org/presentationml/2006/main" showMasterSp="0" showMasterPhAnim="0">
+  <p:cSld>
+    <p:spTree>
+      <p:nvGrpSpPr>
+        <p:cNvPr id="1" name="Shape 285"/>
+        <p:cNvGrpSpPr/>
+        <p:nvPr/>
+      </p:nvGrpSpPr>
+      <p:grpSpPr>
+        <a:xfrm>
+          <a:off x="0" y="0"/>
+          <a:ext cx="0" cy="0"/>
+          <a:chOff x="0" y="0"/>
+          <a:chExt cx="0" cy="0"/>
+        </a:xfrm>
+      </p:grpSpPr>
+      <p:sp>
+        <p:nvSpPr>
+          <p:cNvPr id="286" name="Shape 286"/>
+          <p:cNvSpPr>
+            <a:spLocks noGrp="1" noRot="1" noChangeAspect="1"/>
+          </p:cNvSpPr>
+          <p:nvPr>
+            <p:ph type="sldImg" idx="2"/>
+          </p:nvPr>
+        </p:nvSpPr>
+        <p:spPr>
+          <a:xfrm>
+            <a:off x="381000" y="685800"/>
+            <a:ext cx="6096000" cy="3429000"/>
+          </a:xfrm>
+          <a:custGeom>
+            <a:avLst/>
+            <a:gdLst/>
+            <a:ahLst/>
+            <a:cxnLst/>
+            <a:rect l="0" t="0" r="0" b="0"/>
+            <a:pathLst>
+              <a:path w="120000" h="120000" extrusionOk="0">
+                <a:moveTo>
+                  <a:pt x="0" y="0"/>
+                </a:moveTo>
+                <a:lnTo>
+                  <a:pt x="120000" y="0"/>
+                </a:lnTo>
+                <a:lnTo>
+                  <a:pt x="120000" y="120000"/>
+                </a:lnTo>
+                <a:lnTo>
+                  <a:pt x="0" y="120000"/>
+                </a:lnTo>
+                <a:close/>
+              </a:path>
+            </a:pathLst>
+          </a:custGeom>
+          <a:noFill/>
+          <a:ln w="9525" cap="flat">
+            <a:solidFill>
+              <a:srgbClr val="000000"/>
+            </a:solidFill>
+            <a:prstDash val="solid"/>
+            <a:round/>
+            <a:headEnd type="none" w="med" len="med"/>
+            <a:tailEnd type="none" w="med" len="med"/>
+          </a:ln>
+        </p:spPr>
+      </p:sp>
+      <p:sp>
+        <p:nvSpPr>
+          <p:cNvPr id="287" name="Shape 287"/>
+          <p:cNvSpPr txBox="1">
+            <a:spLocks noGrp="1"/>
+          </p:cNvSpPr>
+          <p:nvPr>
+            <p:ph type="body" idx="1"/>
+          </p:nvPr>
+        </p:nvSpPr>
+        <p:spPr>
+          <a:xfrm>
+            <a:off x="685800" y="4343400"/>
+            <a:ext cx="5486399" cy="4114800"/>
+          </a:xfrm>
+          <a:prstGeom prst="rect">
+            <a:avLst/>
+          </a:prstGeom>
+        </p:spPr>
+        <p:txBody>
+          <a:bodyPr lIns="91425" tIns="91425" rIns="91425" bIns="91425" anchor="t" anchorCtr="0">
+            <a:noAutofit/>
+          </a:bodyPr>
+          <a:lstStyle/>
+          <a:p>
+            <a:pPr>
+              <a:spcBef>
+                <a:spcPts val="0"/>
+              </a:spcBef>
+              <a:buNone/>
+            </a:pPr>
+            <a:endParaRPr/>
+          </a:p>
+        </p:txBody>
+      </p:sp>
+    </p:spTree>
+    <p:extLst>
+      <p:ext uri="{BB962C8B-B14F-4D97-AF65-F5344CB8AC3E}">
+        <p14:creationId xmlns:p14="http://schemas.microsoft.com/office/powerpoint/2010/main" val="3365013047"/>
+      </p:ext>
+    </p:extLst>
+  </p:cSld>
+  <p:clrMapOvr>
+    <a:masterClrMapping/>
+  </p:clrMapOvr>
+</p:notes>
+</file>
+
+<file path=ppt/notesSlides/notesSlide5.xml><?xml version="1.0" encoding="utf-8"?>
 <p:notes xmlns:a="http://schemas.openxmlformats.org/drawingml/2006/main" xmlns:r="http://schemas.openxmlformats.org/officeDocument/2006/relationships" xmlns:p="http://schemas.openxmlformats.org/presentationml/2006/main" showMasterSp="0" showMasterPhAnim="0">
   <p:cSld>
     <p:spTree>
@@ -3106,7 +3222,11 @@
               <a:buNone/>
             </a:pPr>
             <a:r>
-              <a:rPr lang="en-GB" sz="2600" dirty="0"/>
+              <a:rPr lang="en-GB" sz="2600" dirty="0">
+                <a:latin typeface="Cascadia Code" panose="020B0609020000020004" pitchFamily="49" charset="0"/>
+                <a:ea typeface="Cascadia Code" panose="020B0609020000020004" pitchFamily="49" charset="0"/>
+                <a:cs typeface="Cascadia Code" panose="020B0609020000020004" pitchFamily="49" charset="0"/>
+              </a:rPr>
               <a:t>Implementing IaaS and PaaS in Azure</a:t>
             </a:r>
           </a:p>
@@ -3178,7 +3298,11 @@
               <a:buNone/>
             </a:pPr>
             <a:r>
-              <a:rPr lang="en-GB" dirty="0"/>
+              <a:rPr lang="en-GB" dirty="0">
+                <a:latin typeface="Cascadia Code" panose="020B0609020000020004" pitchFamily="49" charset="0"/>
+                <a:ea typeface="Cascadia Code" panose="020B0609020000020004" pitchFamily="49" charset="0"/>
+                <a:cs typeface="Cascadia Code" panose="020B0609020000020004" pitchFamily="49" charset="0"/>
+              </a:rPr>
               <a:t>Case Study</a:t>
             </a:r>
           </a:p>
@@ -3244,7 +3368,11 @@
               <a:buNone/>
             </a:pPr>
             <a:r>
-              <a:rPr lang="en-GB"/>
+              <a:rPr lang="en-GB" dirty="0">
+                <a:latin typeface="Cascadia Code" panose="020B0609020000020004" pitchFamily="49" charset="0"/>
+                <a:ea typeface="Cascadia Code" panose="020B0609020000020004" pitchFamily="49" charset="0"/>
+                <a:cs typeface="Cascadia Code" panose="020B0609020000020004" pitchFamily="49" charset="0"/>
+              </a:rPr>
               <a:t>Contents</a:t>
             </a:r>
           </a:p>
@@ -3287,7 +3415,11 @@
               <a:buChar char="●"/>
             </a:pPr>
             <a:r>
-              <a:rPr lang="en-GB" dirty="0"/>
+              <a:rPr lang="en-GB" dirty="0">
+                <a:latin typeface="Cascadia Code" panose="020B0609020000020004" pitchFamily="49" charset="0"/>
+                <a:ea typeface="Cascadia Code" panose="020B0609020000020004" pitchFamily="49" charset="0"/>
+                <a:cs typeface="Cascadia Code" panose="020B0609020000020004" pitchFamily="49" charset="0"/>
+              </a:rPr>
               <a:t>Business Requirements</a:t>
             </a:r>
           </a:p>
@@ -3304,7 +3436,11 @@
               <a:buChar char="●"/>
             </a:pPr>
             <a:r>
-              <a:rPr lang="en-GB" dirty="0"/>
+              <a:rPr lang="en-GB" dirty="0">
+                <a:latin typeface="Cascadia Code" panose="020B0609020000020004" pitchFamily="49" charset="0"/>
+                <a:ea typeface="Cascadia Code" panose="020B0609020000020004" pitchFamily="49" charset="0"/>
+                <a:cs typeface="Cascadia Code" panose="020B0609020000020004" pitchFamily="49" charset="0"/>
+              </a:rPr>
               <a:t>Implementation flow</a:t>
             </a:r>
           </a:p>
@@ -3321,7 +3457,11 @@
               <a:buChar char="●"/>
             </a:pPr>
             <a:r>
-              <a:rPr lang="en-GB" dirty="0"/>
+              <a:rPr lang="en-GB" dirty="0">
+                <a:latin typeface="Cascadia Code" panose="020B0609020000020004" pitchFamily="49" charset="0"/>
+                <a:ea typeface="Cascadia Code" panose="020B0609020000020004" pitchFamily="49" charset="0"/>
+                <a:cs typeface="Cascadia Code" panose="020B0609020000020004" pitchFamily="49" charset="0"/>
+              </a:rPr>
               <a:t>Takeaway Learnings</a:t>
             </a:r>
           </a:p>
@@ -3387,8 +3527,20 @@
               <a:buNone/>
             </a:pPr>
             <a:r>
-              <a:rPr lang="en-GB"/>
-              <a:t>Business Requirements </a:t>
+              <a:rPr lang="en-GB" dirty="0">
+                <a:latin typeface="Cascadia Code" panose="020B0609020000020004" pitchFamily="49" charset="0"/>
+                <a:ea typeface="Cascadia Code" panose="020B0609020000020004" pitchFamily="49" charset="0"/>
+                <a:cs typeface="Cascadia Code" panose="020B0609020000020004" pitchFamily="49" charset="0"/>
+              </a:rPr>
+              <a:t>Business</a:t>
+            </a:r>
+            <a:r>
+              <a:rPr lang="en-GB" sz="4000" dirty="0">
+                <a:latin typeface="Cascadia Code" panose="020B0609020000020004" pitchFamily="49" charset="0"/>
+                <a:ea typeface="Cascadia Code" panose="020B0609020000020004" pitchFamily="49" charset="0"/>
+                <a:cs typeface="Cascadia Code" panose="020B0609020000020004" pitchFamily="49" charset="0"/>
+              </a:rPr>
+              <a:t> Requirements </a:t>
             </a:r>
           </a:p>
         </p:txBody>
@@ -3405,8 +3557,8 @@
         </p:nvSpPr>
         <p:spPr>
           <a:xfrm>
-            <a:off x="336766" y="1099608"/>
-            <a:ext cx="4988767" cy="3754967"/>
+            <a:off x="336767" y="1215616"/>
+            <a:ext cx="4787968" cy="3845689"/>
           </a:xfrm>
           <a:prstGeom prst="rect">
             <a:avLst/>
@@ -3419,18 +3571,34 @@
           <a:lstStyle/>
           <a:p>
             <a:r>
-              <a:rPr lang="en-GB" sz="1600" dirty="0" err="1"/>
+              <a:rPr lang="en-GB" sz="1400" dirty="0" err="1">
+                <a:latin typeface="Cascadia Code" panose="020B0609020000020004" pitchFamily="49" charset="0"/>
+                <a:ea typeface="Cascadia Code" panose="020B0609020000020004" pitchFamily="49" charset="0"/>
+                <a:cs typeface="Cascadia Code" panose="020B0609020000020004" pitchFamily="49" charset="0"/>
+              </a:rPr>
               <a:t>Nilavembu</a:t>
             </a:r>
             <a:r>
-              <a:rPr lang="en-GB" sz="1600" dirty="0"/>
+              <a:rPr lang="en-GB" sz="1400" dirty="0">
+                <a:latin typeface="Cascadia Code" panose="020B0609020000020004" pitchFamily="49" charset="0"/>
+                <a:ea typeface="Cascadia Code" panose="020B0609020000020004" pitchFamily="49" charset="0"/>
+                <a:cs typeface="Cascadia Code" panose="020B0609020000020004" pitchFamily="49" charset="0"/>
+              </a:rPr>
               <a:t> Herbs </a:t>
             </a:r>
             <a:r>
-              <a:rPr lang="en-IN" sz="1200" dirty="0"/>
+              <a:rPr lang="en-IN" sz="1100" dirty="0">
+                <a:latin typeface="Cascadia Code" panose="020B0609020000020004" pitchFamily="49" charset="0"/>
+                <a:ea typeface="Cascadia Code" panose="020B0609020000020004" pitchFamily="49" charset="0"/>
+                <a:cs typeface="Cascadia Code" panose="020B0609020000020004" pitchFamily="49" charset="0"/>
+              </a:rPr>
               <a:t>provides a safer alternative to modern medicine wherever possible and to offer simple, effective and safe remedies for common problems. spreads awareness about the medicinal uses of these natural and safe herbs all over the world and to make it easily available through their online store for all those who want to enjoy its benefits</a:t>
             </a:r>
-            <a:endParaRPr lang="en-GB" sz="800" dirty="0"/>
+            <a:endParaRPr lang="en-GB" sz="700" dirty="0">
+              <a:latin typeface="Cascadia Code" panose="020B0609020000020004" pitchFamily="49" charset="0"/>
+              <a:ea typeface="Cascadia Code" panose="020B0609020000020004" pitchFamily="49" charset="0"/>
+              <a:cs typeface="Cascadia Code" panose="020B0609020000020004" pitchFamily="49" charset="0"/>
+            </a:endParaRPr>
           </a:p>
           <a:p>
             <a:pPr rtl="0">
@@ -3439,12 +3607,33 @@
               </a:spcBef>
               <a:buNone/>
             </a:pPr>
-            <a:r>
-              <a:rPr lang="en-GB" sz="1600" dirty="0" err="1"/>
+            <a:endParaRPr lang="en-GB" sz="1600" dirty="0">
+              <a:latin typeface="Cascadia Code" panose="020B0609020000020004" pitchFamily="49" charset="0"/>
+              <a:ea typeface="Cascadia Code" panose="020B0609020000020004" pitchFamily="49" charset="0"/>
+              <a:cs typeface="Cascadia Code" panose="020B0609020000020004" pitchFamily="49" charset="0"/>
+            </a:endParaRPr>
+          </a:p>
+          <a:p>
+            <a:pPr rtl="0">
+              <a:spcBef>
+                <a:spcPts val="0"/>
+              </a:spcBef>
+              <a:buNone/>
+            </a:pPr>
+            <a:r>
+              <a:rPr lang="en-GB" sz="1400" dirty="0" err="1">
+                <a:latin typeface="Cascadia Code" panose="020B0609020000020004" pitchFamily="49" charset="0"/>
+                <a:ea typeface="Cascadia Code" panose="020B0609020000020004" pitchFamily="49" charset="0"/>
+                <a:cs typeface="Cascadia Code" panose="020B0609020000020004" pitchFamily="49" charset="0"/>
+              </a:rPr>
               <a:t>Nilavembu</a:t>
             </a:r>
             <a:r>
-              <a:rPr lang="en-GB" sz="1600" dirty="0"/>
+              <a:rPr lang="en-GB" sz="1400" dirty="0">
+                <a:latin typeface="Cascadia Code" panose="020B0609020000020004" pitchFamily="49" charset="0"/>
+                <a:ea typeface="Cascadia Code" panose="020B0609020000020004" pitchFamily="49" charset="0"/>
+                <a:cs typeface="Cascadia Code" panose="020B0609020000020004" pitchFamily="49" charset="0"/>
+              </a:rPr>
               <a:t> Herbs requires</a:t>
             </a:r>
           </a:p>
@@ -3461,7 +3650,11 @@
               <a:buChar char="-"/>
             </a:pPr>
             <a:r>
-              <a:rPr lang="en-GB" sz="1400" dirty="0"/>
+              <a:rPr lang="en-GB" sz="1100" dirty="0">
+                <a:latin typeface="Cascadia Code" panose="020B0609020000020004" pitchFamily="49" charset="0"/>
+                <a:ea typeface="Cascadia Code" panose="020B0609020000020004" pitchFamily="49" charset="0"/>
+                <a:cs typeface="Cascadia Code" panose="020B0609020000020004" pitchFamily="49" charset="0"/>
+              </a:rPr>
               <a:t>A low cost solution based on demand of dynamic business conditions.</a:t>
             </a:r>
           </a:p>
@@ -3478,23 +3671,43 @@
               <a:buChar char="-"/>
             </a:pPr>
             <a:r>
-              <a:rPr lang="en-GB" sz="1400" dirty="0"/>
+              <a:rPr lang="en-GB" sz="1100" dirty="0">
+                <a:latin typeface="Cascadia Code" panose="020B0609020000020004" pitchFamily="49" charset="0"/>
+                <a:ea typeface="Cascadia Code" panose="020B0609020000020004" pitchFamily="49" charset="0"/>
+                <a:cs typeface="Cascadia Code" panose="020B0609020000020004" pitchFamily="49" charset="0"/>
+              </a:rPr>
               <a:t>As the business expands across </a:t>
             </a:r>
             <a:r>
-              <a:rPr lang="en-GB" sz="1400" dirty="0" err="1"/>
+              <a:rPr lang="en-GB" sz="1100" dirty="0" err="1">
+                <a:latin typeface="Cascadia Code" panose="020B0609020000020004" pitchFamily="49" charset="0"/>
+                <a:ea typeface="Cascadia Code" panose="020B0609020000020004" pitchFamily="49" charset="0"/>
+                <a:cs typeface="Cascadia Code" panose="020B0609020000020004" pitchFamily="49" charset="0"/>
+              </a:rPr>
               <a:t>EastUS</a:t>
             </a:r>
             <a:r>
-              <a:rPr lang="en-GB" sz="1400" dirty="0"/>
+              <a:rPr lang="en-GB" sz="1100" dirty="0">
+                <a:latin typeface="Cascadia Code" panose="020B0609020000020004" pitchFamily="49" charset="0"/>
+                <a:ea typeface="Cascadia Code" panose="020B0609020000020004" pitchFamily="49" charset="0"/>
+                <a:cs typeface="Cascadia Code" panose="020B0609020000020004" pitchFamily="49" charset="0"/>
+              </a:rPr>
               <a:t> and SEA, they would like to have their </a:t>
             </a:r>
             <a:r>
-              <a:rPr lang="en-GB" sz="1400" dirty="0" err="1"/>
+              <a:rPr lang="en-GB" sz="1100" dirty="0" err="1">
+                <a:latin typeface="Cascadia Code" panose="020B0609020000020004" pitchFamily="49" charset="0"/>
+                <a:ea typeface="Cascadia Code" panose="020B0609020000020004" pitchFamily="49" charset="0"/>
+                <a:cs typeface="Cascadia Code" panose="020B0609020000020004" pitchFamily="49" charset="0"/>
+              </a:rPr>
               <a:t>DataCenter</a:t>
             </a:r>
             <a:r>
-              <a:rPr lang="en-GB" sz="1400" dirty="0"/>
+              <a:rPr lang="en-GB" sz="1100" dirty="0">
+                <a:latin typeface="Cascadia Code" panose="020B0609020000020004" pitchFamily="49" charset="0"/>
+                <a:ea typeface="Cascadia Code" panose="020B0609020000020004" pitchFamily="49" charset="0"/>
+                <a:cs typeface="Cascadia Code" panose="020B0609020000020004" pitchFamily="49" charset="0"/>
+              </a:rPr>
               <a:t> virtualised using cloud computing.</a:t>
             </a:r>
           </a:p>
@@ -3511,7 +3724,11 @@
               <a:buChar char="-"/>
             </a:pPr>
             <a:r>
-              <a:rPr lang="en-GB" sz="1400" dirty="0"/>
+              <a:rPr lang="en-GB" sz="1100" dirty="0">
+                <a:latin typeface="Cascadia Code" panose="020B0609020000020004" pitchFamily="49" charset="0"/>
+                <a:ea typeface="Cascadia Code" panose="020B0609020000020004" pitchFamily="49" charset="0"/>
+                <a:cs typeface="Cascadia Code" panose="020B0609020000020004" pitchFamily="49" charset="0"/>
+              </a:rPr>
               <a:t>Critical Data should be made available in case of disaster</a:t>
             </a:r>
           </a:p>
@@ -3528,7 +3745,11 @@
               <a:buChar char="-"/>
             </a:pPr>
             <a:r>
-              <a:rPr lang="en-GB" sz="1400" dirty="0"/>
+              <a:rPr lang="en-GB" sz="1100" dirty="0">
+                <a:latin typeface="Cascadia Code" panose="020B0609020000020004" pitchFamily="49" charset="0"/>
+                <a:ea typeface="Cascadia Code" panose="020B0609020000020004" pitchFamily="49" charset="0"/>
+                <a:cs typeface="Cascadia Code" panose="020B0609020000020004" pitchFamily="49" charset="0"/>
+              </a:rPr>
               <a:t>As of now they want to have Proof Of Concept(POC) in Microsoft Azure</a:t>
             </a:r>
           </a:p>
@@ -3545,7 +3766,11 @@
               <a:buChar char="-"/>
             </a:pPr>
             <a:r>
-              <a:rPr lang="en-GB" sz="1400" dirty="0"/>
+              <a:rPr lang="en-GB" sz="1100" dirty="0">
+                <a:latin typeface="Cascadia Code" panose="020B0609020000020004" pitchFamily="49" charset="0"/>
+                <a:ea typeface="Cascadia Code" panose="020B0609020000020004" pitchFamily="49" charset="0"/>
+                <a:cs typeface="Cascadia Code" panose="020B0609020000020004" pitchFamily="49" charset="0"/>
+              </a:rPr>
               <a:t>You have been deployed for POC</a:t>
             </a:r>
           </a:p>
@@ -3562,7 +3787,11 @@
               <a:buChar char="-"/>
             </a:pPr>
             <a:r>
-              <a:rPr lang="en-GB" sz="1400" dirty="0"/>
+              <a:rPr lang="en-GB" sz="1100" dirty="0">
+                <a:latin typeface="Cascadia Code" panose="020B0609020000020004" pitchFamily="49" charset="0"/>
+                <a:ea typeface="Cascadia Code" panose="020B0609020000020004" pitchFamily="49" charset="0"/>
+                <a:cs typeface="Cascadia Code" panose="020B0609020000020004" pitchFamily="49" charset="0"/>
+              </a:rPr>
               <a:t>The following slides will provides required details.</a:t>
             </a:r>
           </a:p>
@@ -3591,7 +3820,7 @@
         </p:blipFill>
         <p:spPr bwMode="auto">
           <a:xfrm>
-            <a:off x="5501416" y="1848380"/>
+            <a:off x="5325533" y="1975114"/>
             <a:ext cx="3562583" cy="2003953"/>
           </a:xfrm>
           <a:prstGeom prst="rect">
@@ -3653,8 +3882,12 @@
           <a:lstStyle/>
           <a:p>
             <a:r>
-              <a:rPr lang="en-IN" dirty="0"/>
-              <a:t>SEA region </a:t>
+              <a:rPr lang="en-IN" dirty="0">
+                <a:latin typeface="Cascadia Code" panose="020B0609020000020004" pitchFamily="49" charset="0"/>
+                <a:ea typeface="Cascadia Code" panose="020B0609020000020004" pitchFamily="49" charset="0"/>
+                <a:cs typeface="Cascadia Code" panose="020B0609020000020004" pitchFamily="49" charset="0"/>
+              </a:rPr>
+              <a:t>South East Asia region </a:t>
             </a:r>
           </a:p>
         </p:txBody>
@@ -3684,7 +3917,11 @@
               <a:buChar char="•"/>
             </a:pPr>
             <a:r>
-              <a:rPr lang="en-US" sz="2000" dirty="0"/>
+              <a:rPr lang="en-US" sz="1800" dirty="0">
+                <a:latin typeface="Cascadia Code" panose="020B0609020000020004" pitchFamily="49" charset="0"/>
+                <a:ea typeface="Cascadia Code" panose="020B0609020000020004" pitchFamily="49" charset="0"/>
+                <a:cs typeface="Cascadia Code" panose="020B0609020000020004" pitchFamily="49" charset="0"/>
+              </a:rPr>
               <a:t>2 web servers with 99.95% high availability</a:t>
             </a:r>
           </a:p>
@@ -3694,15 +3931,27 @@
               <a:buChar char="•"/>
             </a:pPr>
             <a:r>
-              <a:rPr lang="en-US" sz="2000" dirty="0"/>
+              <a:rPr lang="en-US" sz="1800" dirty="0">
+                <a:latin typeface="Cascadia Code" panose="020B0609020000020004" pitchFamily="49" charset="0"/>
+                <a:ea typeface="Cascadia Code" panose="020B0609020000020004" pitchFamily="49" charset="0"/>
+                <a:cs typeface="Cascadia Code" panose="020B0609020000020004" pitchFamily="49" charset="0"/>
+              </a:rPr>
               <a:t>These web services has to be </a:t>
             </a:r>
             <a:r>
-              <a:rPr lang="en-US" sz="2000" dirty="0" err="1"/>
+              <a:rPr lang="en-US" sz="1800" dirty="0" err="1">
+                <a:latin typeface="Cascadia Code" panose="020B0609020000020004" pitchFamily="49" charset="0"/>
+                <a:ea typeface="Cascadia Code" panose="020B0609020000020004" pitchFamily="49" charset="0"/>
+                <a:cs typeface="Cascadia Code" panose="020B0609020000020004" pitchFamily="49" charset="0"/>
+              </a:rPr>
               <a:t>utilised</a:t>
             </a:r>
             <a:r>
-              <a:rPr lang="en-US" sz="2000" dirty="0"/>
+              <a:rPr lang="en-US" sz="1800" dirty="0">
+                <a:latin typeface="Cascadia Code" panose="020B0609020000020004" pitchFamily="49" charset="0"/>
+                <a:ea typeface="Cascadia Code" panose="020B0609020000020004" pitchFamily="49" charset="0"/>
+                <a:cs typeface="Cascadia Code" panose="020B0609020000020004" pitchFamily="49" charset="0"/>
+              </a:rPr>
               <a:t> with proper balance with client affinity with Public IP</a:t>
             </a:r>
           </a:p>
@@ -3712,7 +3961,11 @@
               <a:buChar char="•"/>
             </a:pPr>
             <a:r>
-              <a:rPr lang="en-US" sz="2000" dirty="0"/>
+              <a:rPr lang="en-US" sz="1800" dirty="0">
+                <a:latin typeface="Cascadia Code" panose="020B0609020000020004" pitchFamily="49" charset="0"/>
+                <a:ea typeface="Cascadia Code" panose="020B0609020000020004" pitchFamily="49" charset="0"/>
+                <a:cs typeface="Cascadia Code" panose="020B0609020000020004" pitchFamily="49" charset="0"/>
+              </a:rPr>
               <a:t>Selected web servers should be reachable via RDP from internet</a:t>
             </a:r>
           </a:p>
@@ -3722,7 +3975,11 @@
               <a:buChar char="•"/>
             </a:pPr>
             <a:r>
-              <a:rPr lang="en-US" sz="2000" dirty="0"/>
+              <a:rPr lang="en-US" sz="1800" dirty="0">
+                <a:latin typeface="Cascadia Code" panose="020B0609020000020004" pitchFamily="49" charset="0"/>
+                <a:ea typeface="Cascadia Code" panose="020B0609020000020004" pitchFamily="49" charset="0"/>
+                <a:cs typeface="Cascadia Code" panose="020B0609020000020004" pitchFamily="49" charset="0"/>
+              </a:rPr>
               <a:t>A jump port should accessible from internet to upload contents to web servers.</a:t>
             </a:r>
           </a:p>
@@ -3732,15 +3989,27 @@
               <a:buChar char="•"/>
             </a:pPr>
             <a:r>
-              <a:rPr lang="en-US" sz="2000" dirty="0"/>
+              <a:rPr lang="en-US" sz="1800" dirty="0">
+                <a:latin typeface="Cascadia Code" panose="020B0609020000020004" pitchFamily="49" charset="0"/>
+                <a:ea typeface="Cascadia Code" panose="020B0609020000020004" pitchFamily="49" charset="0"/>
+                <a:cs typeface="Cascadia Code" panose="020B0609020000020004" pitchFamily="49" charset="0"/>
+              </a:rPr>
               <a:t>Protect web server traffic restricted to allowed based on </a:t>
             </a:r>
             <a:r>
-              <a:rPr lang="en-US" sz="2000" dirty="0" err="1"/>
+              <a:rPr lang="en-US" sz="1800" dirty="0" err="1">
+                <a:latin typeface="Cascadia Code" panose="020B0609020000020004" pitchFamily="49" charset="0"/>
+                <a:ea typeface="Cascadia Code" panose="020B0609020000020004" pitchFamily="49" charset="0"/>
+                <a:cs typeface="Cascadia Code" panose="020B0609020000020004" pitchFamily="49" charset="0"/>
+              </a:rPr>
               <a:t>ip</a:t>
             </a:r>
             <a:r>
-              <a:rPr lang="en-US" sz="2000" dirty="0"/>
+              <a:rPr lang="en-US" sz="1800" dirty="0">
+                <a:latin typeface="Cascadia Code" panose="020B0609020000020004" pitchFamily="49" charset="0"/>
+                <a:ea typeface="Cascadia Code" panose="020B0609020000020004" pitchFamily="49" charset="0"/>
+                <a:cs typeface="Cascadia Code" panose="020B0609020000020004" pitchFamily="49" charset="0"/>
+              </a:rPr>
               <a:t> addresses which will be updated as warranted</a:t>
             </a:r>
           </a:p>
@@ -3750,14 +4019,26 @@
               <a:buChar char="•"/>
             </a:pPr>
             <a:r>
-              <a:rPr lang="en-US" sz="2000" dirty="0"/>
+              <a:rPr lang="en-US" sz="1800" dirty="0">
+                <a:latin typeface="Cascadia Code" panose="020B0609020000020004" pitchFamily="49" charset="0"/>
+                <a:ea typeface="Cascadia Code" panose="020B0609020000020004" pitchFamily="49" charset="0"/>
+                <a:cs typeface="Cascadia Code" panose="020B0609020000020004" pitchFamily="49" charset="0"/>
+              </a:rPr>
               <a:t>Enable backup for </a:t>
             </a:r>
             <a:r>
-              <a:rPr lang="en-US" sz="2000" dirty="0" err="1"/>
+              <a:rPr lang="en-US" sz="1800" dirty="0" err="1">
+                <a:latin typeface="Cascadia Code" panose="020B0609020000020004" pitchFamily="49" charset="0"/>
+                <a:ea typeface="Cascadia Code" panose="020B0609020000020004" pitchFamily="49" charset="0"/>
+                <a:cs typeface="Cascadia Code" panose="020B0609020000020004" pitchFamily="49" charset="0"/>
+              </a:rPr>
               <a:t>WebServers</a:t>
             </a:r>
-            <a:endParaRPr lang="en-US" sz="2000" dirty="0"/>
+            <a:endParaRPr lang="en-US" sz="1800" dirty="0">
+              <a:latin typeface="Cascadia Code" panose="020B0609020000020004" pitchFamily="49" charset="0"/>
+              <a:ea typeface="Cascadia Code" panose="020B0609020000020004" pitchFamily="49" charset="0"/>
+              <a:cs typeface="Cascadia Code" panose="020B0609020000020004" pitchFamily="49" charset="0"/>
+            </a:endParaRPr>
           </a:p>
           <a:p>
             <a:pPr marL="342900" indent="-342900">
@@ -3765,18 +4046,34 @@
               <a:buChar char="•"/>
             </a:pPr>
             <a:r>
-              <a:rPr lang="en-US" sz="2000" dirty="0"/>
+              <a:rPr lang="en-US" sz="1800" dirty="0">
+                <a:latin typeface="Cascadia Code" panose="020B0609020000020004" pitchFamily="49" charset="0"/>
+                <a:ea typeface="Cascadia Code" panose="020B0609020000020004" pitchFamily="49" charset="0"/>
+                <a:cs typeface="Cascadia Code" panose="020B0609020000020004" pitchFamily="49" charset="0"/>
+              </a:rPr>
               <a:t>Have alert generated in case of 80% above </a:t>
             </a:r>
             <a:r>
-              <a:rPr lang="en-US" sz="2000" dirty="0" err="1"/>
+              <a:rPr lang="en-US" sz="1800" dirty="0" err="1">
+                <a:latin typeface="Cascadia Code" panose="020B0609020000020004" pitchFamily="49" charset="0"/>
+                <a:ea typeface="Cascadia Code" panose="020B0609020000020004" pitchFamily="49" charset="0"/>
+                <a:cs typeface="Cascadia Code" panose="020B0609020000020004" pitchFamily="49" charset="0"/>
+              </a:rPr>
               <a:t>cpu</a:t>
             </a:r>
             <a:r>
-              <a:rPr lang="en-US" sz="2000" dirty="0"/>
+              <a:rPr lang="en-US" sz="1800" dirty="0">
+                <a:latin typeface="Cascadia Code" panose="020B0609020000020004" pitchFamily="49" charset="0"/>
+                <a:ea typeface="Cascadia Code" panose="020B0609020000020004" pitchFamily="49" charset="0"/>
+                <a:cs typeface="Cascadia Code" panose="020B0609020000020004" pitchFamily="49" charset="0"/>
+              </a:rPr>
               <a:t> usage</a:t>
             </a:r>
-            <a:endParaRPr lang="en-IN" sz="2000" dirty="0"/>
+            <a:endParaRPr lang="en-IN" sz="1800" dirty="0">
+              <a:latin typeface="Cascadia Code" panose="020B0609020000020004" pitchFamily="49" charset="0"/>
+              <a:ea typeface="Cascadia Code" panose="020B0609020000020004" pitchFamily="49" charset="0"/>
+              <a:cs typeface="Cascadia Code" panose="020B0609020000020004" pitchFamily="49" charset="0"/>
+            </a:endParaRPr>
           </a:p>
         </p:txBody>
       </p:sp>
@@ -3826,10 +4123,13 @@
           <a:lstStyle/>
           <a:p>
             <a:r>
-              <a:rPr lang="en-IN" dirty="0" err="1"/>
-              <a:t>EastUS</a:t>
-            </a:r>
-            <a:endParaRPr lang="en-IN" dirty="0"/>
+              <a:rPr lang="en-IN" dirty="0">
+                <a:latin typeface="Cascadia Code" panose="020B0609020000020004" pitchFamily="49" charset="0"/>
+                <a:ea typeface="Cascadia Code" panose="020B0609020000020004" pitchFamily="49" charset="0"/>
+                <a:cs typeface="Cascadia Code" panose="020B0609020000020004" pitchFamily="49" charset="0"/>
+              </a:rPr>
+              <a:t>East US region</a:t>
+            </a:r>
           </a:p>
         </p:txBody>
       </p:sp>
@@ -3853,12 +4153,12 @@
               <a:buChar char="•"/>
             </a:pPr>
             <a:r>
-              <a:rPr lang="en-US" sz="2400" dirty="0" err="1"/>
-              <a:t>EastUS</a:t>
-            </a:r>
-            <a:r>
-              <a:rPr lang="en-US" sz="2400" dirty="0"/>
-              <a:t> server (Server11) should be accessible from internet via public IP</a:t>
+              <a:rPr lang="en-US" sz="2400" dirty="0">
+                <a:latin typeface="Cascadia Code" panose="020B0609020000020004" pitchFamily="49" charset="0"/>
+                <a:ea typeface="Cascadia Code" panose="020B0609020000020004" pitchFamily="49" charset="0"/>
+                <a:cs typeface="Cascadia Code" panose="020B0609020000020004" pitchFamily="49" charset="0"/>
+              </a:rPr>
+              <a:t>East US server (Server11) should be accessible from internet via public IP</a:t>
             </a:r>
           </a:p>
           <a:p>
@@ -3867,7 +4167,11 @@
               <a:buChar char="•"/>
             </a:pPr>
             <a:r>
-              <a:rPr lang="en-US" sz="2400" dirty="0"/>
+              <a:rPr lang="en-US" sz="2400" dirty="0">
+                <a:latin typeface="Cascadia Code" panose="020B0609020000020004" pitchFamily="49" charset="0"/>
+                <a:ea typeface="Cascadia Code" panose="020B0609020000020004" pitchFamily="49" charset="0"/>
+                <a:cs typeface="Cascadia Code" panose="020B0609020000020004" pitchFamily="49" charset="0"/>
+              </a:rPr>
               <a:t>Establish secure Connection to SEA-EUS Azure sites</a:t>
             </a:r>
           </a:p>
@@ -3877,18 +4181,34 @@
               <a:buChar char="•"/>
             </a:pPr>
             <a:r>
-              <a:rPr lang="en-US" sz="2400" dirty="0"/>
+              <a:rPr lang="en-US" sz="2400" dirty="0">
+                <a:latin typeface="Cascadia Code" panose="020B0609020000020004" pitchFamily="49" charset="0"/>
+                <a:ea typeface="Cascadia Code" panose="020B0609020000020004" pitchFamily="49" charset="0"/>
+                <a:cs typeface="Cascadia Code" panose="020B0609020000020004" pitchFamily="49" charset="0"/>
+              </a:rPr>
               <a:t>All servers should be reachable with internal </a:t>
             </a:r>
             <a:r>
-              <a:rPr lang="en-US" sz="2400" dirty="0" err="1"/>
+              <a:rPr lang="en-US" sz="2400" dirty="0" err="1">
+                <a:latin typeface="Cascadia Code" panose="020B0609020000020004" pitchFamily="49" charset="0"/>
+                <a:ea typeface="Cascadia Code" panose="020B0609020000020004" pitchFamily="49" charset="0"/>
+                <a:cs typeface="Cascadia Code" panose="020B0609020000020004" pitchFamily="49" charset="0"/>
+              </a:rPr>
               <a:t>ip</a:t>
             </a:r>
             <a:r>
-              <a:rPr lang="en-US" sz="2400" dirty="0"/>
+              <a:rPr lang="en-US" sz="2400" dirty="0">
+                <a:latin typeface="Cascadia Code" panose="020B0609020000020004" pitchFamily="49" charset="0"/>
+                <a:ea typeface="Cascadia Code" panose="020B0609020000020004" pitchFamily="49" charset="0"/>
+                <a:cs typeface="Cascadia Code" panose="020B0609020000020004" pitchFamily="49" charset="0"/>
+              </a:rPr>
               <a:t> addresses</a:t>
             </a:r>
-            <a:endParaRPr lang="en-IN" sz="2400" dirty="0"/>
+            <a:endParaRPr lang="en-IN" sz="2400" dirty="0">
+              <a:latin typeface="Cascadia Code" panose="020B0609020000020004" pitchFamily="49" charset="0"/>
+              <a:ea typeface="Cascadia Code" panose="020B0609020000020004" pitchFamily="49" charset="0"/>
+              <a:cs typeface="Cascadia Code" panose="020B0609020000020004" pitchFamily="49" charset="0"/>
+            </a:endParaRPr>
           </a:p>
         </p:txBody>
       </p:sp>
@@ -3944,7 +4264,11 @@
           <a:lstStyle/>
           <a:p>
             <a:r>
-              <a:rPr lang="en-IN" dirty="0"/>
+              <a:rPr lang="en-IN" dirty="0">
+                <a:latin typeface="Cascadia Code" panose="020B0609020000020004" pitchFamily="49" charset="0"/>
+                <a:ea typeface="Cascadia Code" panose="020B0609020000020004" pitchFamily="49" charset="0"/>
+                <a:cs typeface="Cascadia Code" panose="020B0609020000020004" pitchFamily="49" charset="0"/>
+              </a:rPr>
               <a:t>Storage Requirements</a:t>
             </a:r>
           </a:p>
@@ -3976,7 +4300,11 @@
               <a:buChar char="•"/>
             </a:pPr>
             <a:r>
-              <a:rPr lang="en-IN" sz="2000" dirty="0"/>
+              <a:rPr lang="en-IN" sz="2000" dirty="0">
+                <a:latin typeface="Cascadia Code" panose="020B0609020000020004" pitchFamily="49" charset="0"/>
+                <a:ea typeface="Cascadia Code" panose="020B0609020000020004" pitchFamily="49" charset="0"/>
+                <a:cs typeface="Cascadia Code" panose="020B0609020000020004" pitchFamily="49" charset="0"/>
+              </a:rPr>
               <a:t>EUS based resources should provide data resiliency in case of azure datacentre failure. </a:t>
             </a:r>
           </a:p>
@@ -3986,15 +4314,27 @@
               <a:buChar char="•"/>
             </a:pPr>
             <a:r>
-              <a:rPr lang="en-IN" sz="2000" dirty="0"/>
+              <a:rPr lang="en-IN" sz="2000" dirty="0">
+                <a:latin typeface="Cascadia Code" panose="020B0609020000020004" pitchFamily="49" charset="0"/>
+                <a:ea typeface="Cascadia Code" panose="020B0609020000020004" pitchFamily="49" charset="0"/>
+                <a:cs typeface="Cascadia Code" panose="020B0609020000020004" pitchFamily="49" charset="0"/>
+              </a:rPr>
               <a:t>The storage should be accessible  by applications with secure access. provide access </a:t>
             </a:r>
             <a:r>
-              <a:rPr lang="en-IN" sz="2000" dirty="0" err="1"/>
+              <a:rPr lang="en-IN" sz="2000" dirty="0" err="1">
+                <a:latin typeface="Cascadia Code" panose="020B0609020000020004" pitchFamily="49" charset="0"/>
+                <a:ea typeface="Cascadia Code" panose="020B0609020000020004" pitchFamily="49" charset="0"/>
+                <a:cs typeface="Cascadia Code" panose="020B0609020000020004" pitchFamily="49" charset="0"/>
+              </a:rPr>
               <a:t>urls</a:t>
             </a:r>
             <a:r>
-              <a:rPr lang="en-IN" sz="2000" dirty="0"/>
+              <a:rPr lang="en-IN" sz="2000" dirty="0">
+                <a:latin typeface="Cascadia Code" panose="020B0609020000020004" pitchFamily="49" charset="0"/>
+                <a:ea typeface="Cascadia Code" panose="020B0609020000020004" pitchFamily="49" charset="0"/>
+                <a:cs typeface="Cascadia Code" panose="020B0609020000020004" pitchFamily="49" charset="0"/>
+              </a:rPr>
               <a:t> and keys.</a:t>
             </a:r>
           </a:p>
@@ -4004,7 +4344,11 @@
               <a:buChar char="•"/>
             </a:pPr>
             <a:r>
-              <a:rPr lang="en-IN" sz="2000" dirty="0"/>
+              <a:rPr lang="en-IN" sz="2000" dirty="0">
+                <a:latin typeface="Cascadia Code" panose="020B0609020000020004" pitchFamily="49" charset="0"/>
+                <a:ea typeface="Cascadia Code" panose="020B0609020000020004" pitchFamily="49" charset="0"/>
+                <a:cs typeface="Cascadia Code" panose="020B0609020000020004" pitchFamily="49" charset="0"/>
+              </a:rPr>
               <a:t>Sales manager should access his resource from windows explorer.</a:t>
             </a:r>
           </a:p>
@@ -4014,15 +4358,27 @@
               <a:buChar char="•"/>
             </a:pPr>
             <a:r>
-              <a:rPr lang="en-IN" sz="2000" dirty="0"/>
+              <a:rPr lang="en-IN" sz="2000" dirty="0">
+                <a:latin typeface="Cascadia Code" panose="020B0609020000020004" pitchFamily="49" charset="0"/>
+                <a:ea typeface="Cascadia Code" panose="020B0609020000020004" pitchFamily="49" charset="0"/>
+                <a:cs typeface="Cascadia Code" panose="020B0609020000020004" pitchFamily="49" charset="0"/>
+              </a:rPr>
               <a:t>SEA data resources must provide high resiliency in case of even multiple azure data </a:t>
             </a:r>
             <a:r>
-              <a:rPr lang="en-IN" sz="2000" dirty="0" err="1"/>
+              <a:rPr lang="en-IN" sz="2000" dirty="0" err="1">
+                <a:latin typeface="Cascadia Code" panose="020B0609020000020004" pitchFamily="49" charset="0"/>
+                <a:ea typeface="Cascadia Code" panose="020B0609020000020004" pitchFamily="49" charset="0"/>
+                <a:cs typeface="Cascadia Code" panose="020B0609020000020004" pitchFamily="49" charset="0"/>
+              </a:rPr>
               <a:t>center</a:t>
             </a:r>
             <a:r>
-              <a:rPr lang="en-IN" sz="2000" dirty="0"/>
+              <a:rPr lang="en-IN" sz="2000" dirty="0">
+                <a:latin typeface="Cascadia Code" panose="020B0609020000020004" pitchFamily="49" charset="0"/>
+                <a:ea typeface="Cascadia Code" panose="020B0609020000020004" pitchFamily="49" charset="0"/>
+                <a:cs typeface="Cascadia Code" panose="020B0609020000020004" pitchFamily="49" charset="0"/>
+              </a:rPr>
               <a:t> failures</a:t>
             </a:r>
           </a:p>
@@ -4080,10 +4436,18 @@
           <a:lstStyle/>
           <a:p>
             <a:r>
-              <a:rPr lang="en-IN" dirty="0"/>
+              <a:rPr lang="en-IN" dirty="0">
+                <a:latin typeface="Cascadia Code" panose="020B0609020000020004" pitchFamily="49" charset="0"/>
+                <a:ea typeface="Cascadia Code" panose="020B0609020000020004" pitchFamily="49" charset="0"/>
+                <a:cs typeface="Cascadia Code" panose="020B0609020000020004" pitchFamily="49" charset="0"/>
+              </a:rPr>
               <a:t>Azure Resource management</a:t>
             </a:r>
-            <a:endParaRPr lang="en-GB" dirty="0"/>
+            <a:endParaRPr lang="en-GB" dirty="0">
+              <a:latin typeface="Cascadia Code" panose="020B0609020000020004" pitchFamily="49" charset="0"/>
+              <a:ea typeface="Cascadia Code" panose="020B0609020000020004" pitchFamily="49" charset="0"/>
+              <a:cs typeface="Cascadia Code" panose="020B0609020000020004" pitchFamily="49" charset="0"/>
+            </a:endParaRPr>
           </a:p>
         </p:txBody>
       </p:sp>
@@ -4118,15 +4482,27 @@
               <a:buChar char="•"/>
             </a:pPr>
             <a:r>
-              <a:rPr lang="en-US" dirty="0"/>
+              <a:rPr lang="en-US" sz="2000" dirty="0">
+                <a:latin typeface="Cascadia Code" panose="020B0609020000020004" pitchFamily="49" charset="0"/>
+                <a:ea typeface="Cascadia Code" panose="020B0609020000020004" pitchFamily="49" charset="0"/>
+                <a:cs typeface="Cascadia Code" panose="020B0609020000020004" pitchFamily="49" charset="0"/>
+              </a:rPr>
               <a:t>Create </a:t>
             </a:r>
             <a:r>
-              <a:rPr lang="en-US" dirty="0" err="1"/>
+              <a:rPr lang="en-US" sz="2000" dirty="0" err="1">
+                <a:latin typeface="Cascadia Code" panose="020B0609020000020004" pitchFamily="49" charset="0"/>
+                <a:ea typeface="Cascadia Code" panose="020B0609020000020004" pitchFamily="49" charset="0"/>
+                <a:cs typeface="Cascadia Code" panose="020B0609020000020004" pitchFamily="49" charset="0"/>
+              </a:rPr>
               <a:t>Vmadmin</a:t>
             </a:r>
             <a:r>
-              <a:rPr lang="en-US" dirty="0"/>
+              <a:rPr lang="en-US" sz="2000" dirty="0">
+                <a:latin typeface="Cascadia Code" panose="020B0609020000020004" pitchFamily="49" charset="0"/>
+                <a:ea typeface="Cascadia Code" panose="020B0609020000020004" pitchFamily="49" charset="0"/>
+                <a:cs typeface="Cascadia Code" panose="020B0609020000020004" pitchFamily="49" charset="0"/>
+              </a:rPr>
               <a:t> user who can manage all VM in the subscription</a:t>
             </a:r>
           </a:p>
@@ -4136,18 +4512,34 @@
               <a:buChar char="•"/>
             </a:pPr>
             <a:r>
-              <a:rPr lang="en-US" dirty="0"/>
+              <a:rPr lang="en-US" sz="2000" dirty="0">
+                <a:latin typeface="Cascadia Code" panose="020B0609020000020004" pitchFamily="49" charset="0"/>
+                <a:ea typeface="Cascadia Code" panose="020B0609020000020004" pitchFamily="49" charset="0"/>
+                <a:cs typeface="Cascadia Code" panose="020B0609020000020004" pitchFamily="49" charset="0"/>
+              </a:rPr>
               <a:t>Create </a:t>
             </a:r>
             <a:r>
-              <a:rPr lang="en-US" dirty="0" err="1"/>
+              <a:rPr lang="en-US" sz="2000" dirty="0" err="1">
+                <a:latin typeface="Cascadia Code" panose="020B0609020000020004" pitchFamily="49" charset="0"/>
+                <a:ea typeface="Cascadia Code" panose="020B0609020000020004" pitchFamily="49" charset="0"/>
+                <a:cs typeface="Cascadia Code" panose="020B0609020000020004" pitchFamily="49" charset="0"/>
+              </a:rPr>
               <a:t>Backup_admin</a:t>
             </a:r>
             <a:r>
-              <a:rPr lang="en-US" dirty="0"/>
+              <a:rPr lang="en-US" sz="2000" dirty="0">
+                <a:latin typeface="Cascadia Code" panose="020B0609020000020004" pitchFamily="49" charset="0"/>
+                <a:ea typeface="Cascadia Code" panose="020B0609020000020004" pitchFamily="49" charset="0"/>
+                <a:cs typeface="Cascadia Code" panose="020B0609020000020004" pitchFamily="49" charset="0"/>
+              </a:rPr>
               <a:t> user who can manage backup only in EUS servers in EURG</a:t>
             </a:r>
-            <a:endParaRPr lang="en-GB" dirty="0"/>
+            <a:endParaRPr lang="en-GB" sz="2000" dirty="0">
+              <a:latin typeface="Cascadia Code" panose="020B0609020000020004" pitchFamily="49" charset="0"/>
+              <a:ea typeface="Cascadia Code" panose="020B0609020000020004" pitchFamily="49" charset="0"/>
+              <a:cs typeface="Cascadia Code" panose="020B0609020000020004" pitchFamily="49" charset="0"/>
+            </a:endParaRPr>
           </a:p>
         </p:txBody>
       </p:sp>
@@ -4213,8 +4605,145 @@
               <a:buNone/>
             </a:pPr>
             <a:r>
-              <a:rPr lang="en-GB" dirty="0"/>
-              <a:t>Implementation Flow</a:t>
+              <a:rPr lang="en-GB" dirty="0">
+                <a:latin typeface="Cascadia Code" panose="020B0609020000020004" pitchFamily="49" charset="0"/>
+                <a:ea typeface="Cascadia Code" panose="020B0609020000020004" pitchFamily="49" charset="0"/>
+                <a:cs typeface="Cascadia Code" panose="020B0609020000020004" pitchFamily="49" charset="0"/>
+              </a:rPr>
+              <a:t>Implementation Flow - RGs</a:t>
+            </a:r>
+          </a:p>
+        </p:txBody>
+      </p:sp>
+      <p:pic>
+        <p:nvPicPr>
+          <p:cNvPr id="4" name="Picture 3" descr="South East Asia Region&#10;">
+            <a:extLst>
+              <a:ext uri="{FF2B5EF4-FFF2-40B4-BE49-F238E27FC236}">
+                <a16:creationId xmlns:a16="http://schemas.microsoft.com/office/drawing/2014/main" id="{874B430C-FB5A-4120-9429-F9AC86496910}"/>
+              </a:ext>
+            </a:extLst>
+          </p:cNvPr>
+          <p:cNvPicPr>
+            <a:picLocks noChangeAspect="1"/>
+          </p:cNvPicPr>
+          <p:nvPr/>
+        </p:nvPicPr>
+        <p:blipFill rotWithShape="1">
+          <a:blip r:embed="rId3"/>
+          <a:srcRect l="892" t="20128" r="45027" b="22333"/>
+          <a:stretch/>
+        </p:blipFill>
+        <p:spPr>
+          <a:xfrm>
+            <a:off x="144538" y="1794680"/>
+            <a:ext cx="4065259" cy="2713026"/>
+          </a:xfrm>
+          <a:prstGeom prst="rect">
+            <a:avLst/>
+          </a:prstGeom>
+        </p:spPr>
+      </p:pic>
+      <p:pic>
+        <p:nvPicPr>
+          <p:cNvPr id="5" name="Picture 4" descr="East US Region&#10;">
+            <a:extLst>
+              <a:ext uri="{FF2B5EF4-FFF2-40B4-BE49-F238E27FC236}">
+                <a16:creationId xmlns:a16="http://schemas.microsoft.com/office/drawing/2014/main" id="{5B632011-A7CE-4CFD-99D2-ADBF8944DBEE}"/>
+              </a:ext>
+            </a:extLst>
+          </p:cNvPr>
+          <p:cNvPicPr>
+            <a:picLocks noChangeAspect="1"/>
+          </p:cNvPicPr>
+          <p:nvPr/>
+        </p:nvPicPr>
+        <p:blipFill rotWithShape="1">
+          <a:blip r:embed="rId3"/>
+          <a:srcRect l="59300" t="40638" r="1192" b="22333"/>
+          <a:stretch/>
+        </p:blipFill>
+        <p:spPr>
+          <a:xfrm>
+            <a:off x="4934205" y="1980417"/>
+            <a:ext cx="3971925" cy="2335080"/>
+          </a:xfrm>
+          <a:prstGeom prst="rect">
+            <a:avLst/>
+          </a:prstGeom>
+        </p:spPr>
+      </p:pic>
+    </p:spTree>
+    <p:extLst>
+      <p:ext uri="{BB962C8B-B14F-4D97-AF65-F5344CB8AC3E}">
+        <p14:creationId xmlns:p14="http://schemas.microsoft.com/office/powerpoint/2010/main" val="3175762238"/>
+      </p:ext>
+    </p:extLst>
+  </p:cSld>
+  <p:clrMapOvr>
+    <a:masterClrMapping/>
+  </p:clrMapOvr>
+  <p:transition spd="slow">
+    <p:cut/>
+  </p:transition>
+</p:sld>
+</file>
+
+<file path=ppt/slides/slide9.xml><?xml version="1.0" encoding="utf-8"?>
+<p:sld xmlns:a="http://schemas.openxmlformats.org/drawingml/2006/main" xmlns:r="http://schemas.openxmlformats.org/officeDocument/2006/relationships" xmlns:p="http://schemas.openxmlformats.org/presentationml/2006/main">
+  <p:cSld>
+    <p:spTree>
+      <p:nvGrpSpPr>
+        <p:cNvPr id="1" name="Shape 282"/>
+        <p:cNvGrpSpPr/>
+        <p:nvPr/>
+      </p:nvGrpSpPr>
+      <p:grpSpPr>
+        <a:xfrm>
+          <a:off x="0" y="0"/>
+          <a:ext cx="0" cy="0"/>
+          <a:chOff x="0" y="0"/>
+          <a:chExt cx="0" cy="0"/>
+        </a:xfrm>
+      </p:grpSpPr>
+      <p:sp>
+        <p:nvSpPr>
+          <p:cNvPr id="283" name="Shape 283"/>
+          <p:cNvSpPr txBox="1">
+            <a:spLocks noGrp="1"/>
+          </p:cNvSpPr>
+          <p:nvPr>
+            <p:ph type="title"/>
+          </p:nvPr>
+        </p:nvSpPr>
+        <p:spPr>
+          <a:xfrm>
+            <a:off x="457199" y="198203"/>
+            <a:ext cx="8686801" cy="857400"/>
+          </a:xfrm>
+          <a:prstGeom prst="rect">
+            <a:avLst/>
+          </a:prstGeom>
+        </p:spPr>
+        <p:txBody>
+          <a:bodyPr lIns="91425" tIns="91425" rIns="91425" bIns="91425" anchor="b" anchorCtr="0">
+            <a:noAutofit/>
+          </a:bodyPr>
+          <a:lstStyle/>
+          <a:p>
+            <a:pPr>
+              <a:spcBef>
+                <a:spcPts val="0"/>
+              </a:spcBef>
+              <a:buNone/>
+            </a:pPr>
+            <a:r>
+              <a:rPr lang="en-GB" dirty="0">
+                <a:latin typeface="Cascadia Code" panose="020B0609020000020004" pitchFamily="49" charset="0"/>
+                <a:ea typeface="Cascadia Code" panose="020B0609020000020004" pitchFamily="49" charset="0"/>
+                <a:cs typeface="Cascadia Code" panose="020B0609020000020004" pitchFamily="49" charset="0"/>
+              </a:rPr>
+              <a:t>Implementation Flow - Global</a:t>
             </a:r>
           </a:p>
         </p:txBody>
@@ -4233,16 +4762,44 @@
           </p:cNvPicPr>
           <p:nvPr/>
         </p:nvPicPr>
-        <p:blipFill>
+        <p:blipFill rotWithShape="1">
           <a:blip r:embed="rId3"/>
-          <a:stretch>
-            <a:fillRect/>
-          </a:stretch>
+          <a:srcRect l="51368" t="6456" r="36791" b="70737"/>
+          <a:stretch/>
         </p:blipFill>
         <p:spPr>
           <a:xfrm>
-            <a:off x="1343127" y="1185863"/>
-            <a:ext cx="5993504" cy="3759434"/>
+            <a:off x="2285999" y="1883187"/>
+            <a:ext cx="1637732" cy="1978618"/>
+          </a:xfrm>
+          <a:prstGeom prst="rect">
+            <a:avLst/>
+          </a:prstGeom>
+        </p:spPr>
+      </p:pic>
+      <p:pic>
+        <p:nvPicPr>
+          <p:cNvPr id="6" name="Picture 5" descr="Tenant">
+            <a:extLst>
+              <a:ext uri="{FF2B5EF4-FFF2-40B4-BE49-F238E27FC236}">
+                <a16:creationId xmlns:a16="http://schemas.microsoft.com/office/drawing/2014/main" id="{344615E9-3D95-4AC9-8BC1-55D3B0797263}"/>
+              </a:ext>
+            </a:extLst>
+          </p:cNvPr>
+          <p:cNvPicPr>
+            <a:picLocks noChangeAspect="1"/>
+          </p:cNvPicPr>
+          <p:nvPr/>
+        </p:nvPicPr>
+        <p:blipFill rotWithShape="1">
+          <a:blip r:embed="rId3"/>
+          <a:srcRect l="48825" t="66595" r="34780" b="589"/>
+          <a:stretch/>
+        </p:blipFill>
+        <p:spPr>
+          <a:xfrm>
+            <a:off x="5224625" y="1883187"/>
+            <a:ext cx="1633376" cy="2050725"/>
           </a:xfrm>
           <a:prstGeom prst="rect">
             <a:avLst/>
@@ -4257,124 +4814,6 @@
   <p:transition spd="slow">
     <p:cut/>
   </p:transition>
-</p:sld>
-</file>
-
-<file path=ppt/slides/slide9.xml><?xml version="1.0" encoding="utf-8"?>
-<p:sld xmlns:a="http://schemas.openxmlformats.org/drawingml/2006/main" xmlns:r="http://schemas.openxmlformats.org/officeDocument/2006/relationships" xmlns:p="http://schemas.openxmlformats.org/presentationml/2006/main">
-  <p:cSld>
-    <p:spTree>
-      <p:nvGrpSpPr>
-        <p:cNvPr id="1" name=""/>
-        <p:cNvGrpSpPr/>
-        <p:nvPr/>
-      </p:nvGrpSpPr>
-      <p:grpSpPr>
-        <a:xfrm>
-          <a:off x="0" y="0"/>
-          <a:ext cx="0" cy="0"/>
-          <a:chOff x="0" y="0"/>
-          <a:chExt cx="0" cy="0"/>
-        </a:xfrm>
-      </p:grpSpPr>
-      <p:sp>
-        <p:nvSpPr>
-          <p:cNvPr id="2" name="Shape 283">
-            <a:extLst>
-              <a:ext uri="{FF2B5EF4-FFF2-40B4-BE49-F238E27FC236}">
-                <a16:creationId xmlns:a16="http://schemas.microsoft.com/office/drawing/2014/main" id="{1E5C1236-947C-4770-9BC6-2D0BB6BE79E3}"/>
-              </a:ext>
-            </a:extLst>
-          </p:cNvPr>
-          <p:cNvSpPr txBox="1">
-            <a:spLocks noGrp="1"/>
-          </p:cNvSpPr>
-          <p:nvPr>
-            <p:ph type="title"/>
-          </p:nvPr>
-        </p:nvSpPr>
-        <p:spPr>
-          <a:xfrm>
-            <a:off x="457200" y="198203"/>
-            <a:ext cx="8229600" cy="857400"/>
-          </a:xfrm>
-          <a:prstGeom prst="rect">
-            <a:avLst/>
-          </a:prstGeom>
-        </p:spPr>
-        <p:txBody>
-          <a:bodyPr lIns="91425" tIns="91425" rIns="91425" bIns="91425" anchor="b" anchorCtr="0">
-            <a:noAutofit/>
-          </a:bodyPr>
-          <a:lstStyle/>
-          <a:p>
-            <a:pPr>
-              <a:spcBef>
-                <a:spcPts val="0"/>
-              </a:spcBef>
-              <a:buNone/>
-            </a:pPr>
-            <a:r>
-              <a:rPr lang="en-GB" dirty="0"/>
-              <a:t>Activity List</a:t>
-            </a:r>
-          </a:p>
-        </p:txBody>
-      </p:sp>
-      <p:sp>
-        <p:nvSpPr>
-          <p:cNvPr id="3" name="Text Placeholder 2">
-            <a:extLst>
-              <a:ext uri="{FF2B5EF4-FFF2-40B4-BE49-F238E27FC236}">
-                <a16:creationId xmlns:a16="http://schemas.microsoft.com/office/drawing/2014/main" id="{DEB58688-5E80-4E78-A263-45FB90ACA11E}"/>
-              </a:ext>
-            </a:extLst>
-          </p:cNvPr>
-          <p:cNvSpPr>
-            <a:spLocks noGrp="1"/>
-          </p:cNvSpPr>
-          <p:nvPr>
-            <p:ph type="body" idx="1"/>
-          </p:nvPr>
-        </p:nvSpPr>
-        <p:spPr>
-          <a:xfrm>
-            <a:off x="356347" y="1643904"/>
-            <a:ext cx="8229600" cy="2289362"/>
-          </a:xfrm>
-        </p:spPr>
-        <p:txBody>
-          <a:bodyPr/>
-          <a:lstStyle/>
-          <a:p>
-            <a:pPr marL="457200" indent="-457200">
-              <a:buFont typeface="Arial" panose="020B0604020202020204" pitchFamily="34" charset="0"/>
-              <a:buChar char="•"/>
-            </a:pPr>
-            <a:r>
-              <a:rPr lang="en-US" dirty="0"/>
-              <a:t>Please refer to the below link for the Activity List:</a:t>
-            </a:r>
-            <a:endParaRPr lang="en-GB" dirty="0"/>
-          </a:p>
-          <a:p>
-            <a:r>
-              <a:rPr lang="en-US" dirty="0"/>
-              <a:t>	https://github.com/maatlek/cfs-proj.git</a:t>
-            </a:r>
-          </a:p>
-        </p:txBody>
-      </p:sp>
-    </p:spTree>
-    <p:extLst>
-      <p:ext uri="{BB962C8B-B14F-4D97-AF65-F5344CB8AC3E}">
-        <p14:creationId xmlns:p14="http://schemas.microsoft.com/office/powerpoint/2010/main" val="1064704664"/>
-      </p:ext>
-    </p:extLst>
-  </p:cSld>
-  <p:clrMapOvr>
-    <a:masterClrMapping/>
-  </p:clrMapOvr>
 </p:sld>
 </file>
 

</xml_diff>